<commit_message>
L16 Added homework into presentation
</commit_message>
<xml_diff>
--- a/Lectures/Lesson 16 - Spring Framework.pptx
+++ b/Lectures/Lesson 16 - Spring Framework.pptx
@@ -5,7 +5,7 @@
     <p:sldMasterId id="2147483678" r:id="rId1"/>
   </p:sldMasterIdLst>
   <p:notesMasterIdLst>
-    <p:notesMasterId r:id="rId25"/>
+    <p:notesMasterId r:id="rId26"/>
   </p:notesMasterIdLst>
   <p:sldIdLst>
     <p:sldId id="256" r:id="rId2"/>
@@ -28,35 +28,36 @@
     <p:sldId id="374" r:id="rId19"/>
     <p:sldId id="377" r:id="rId20"/>
     <p:sldId id="378" r:id="rId21"/>
-    <p:sldId id="434" r:id="rId22"/>
-    <p:sldId id="317" r:id="rId23"/>
-    <p:sldId id="339" r:id="rId24"/>
+    <p:sldId id="435" r:id="rId22"/>
+    <p:sldId id="434" r:id="rId23"/>
+    <p:sldId id="317" r:id="rId24"/>
+    <p:sldId id="339" r:id="rId25"/>
   </p:sldIdLst>
   <p:sldSz cx="9144000" cy="5143500" type="screen16x9"/>
   <p:notesSz cx="6858000" cy="9144000"/>
   <p:embeddedFontLst>
     <p:embeddedFont>
       <p:font typeface="Dosis" panose="020B0604020202020204" charset="0"/>
-      <p:regular r:id="rId26"/>
-      <p:bold r:id="rId27"/>
+      <p:regular r:id="rId27"/>
+      <p:bold r:id="rId28"/>
     </p:embeddedFont>
     <p:embeddedFont>
       <p:font typeface="Lato" panose="020F0502020204030203" pitchFamily="34" charset="0"/>
-      <p:regular r:id="rId28"/>
-      <p:bold r:id="rId29"/>
-      <p:italic r:id="rId30"/>
-      <p:boldItalic r:id="rId31"/>
+      <p:regular r:id="rId29"/>
+      <p:bold r:id="rId30"/>
+      <p:italic r:id="rId31"/>
+      <p:boldItalic r:id="rId32"/>
     </p:embeddedFont>
     <p:embeddedFont>
       <p:font typeface="Raleway" panose="020B0604020202020204" charset="0"/>
-      <p:regular r:id="rId32"/>
-      <p:bold r:id="rId33"/>
-      <p:italic r:id="rId34"/>
-      <p:boldItalic r:id="rId35"/>
+      <p:regular r:id="rId33"/>
+      <p:bold r:id="rId34"/>
+      <p:italic r:id="rId35"/>
+      <p:boldItalic r:id="rId36"/>
     </p:embeddedFont>
     <p:embeddedFont>
       <p:font typeface="Sniglet" panose="020B0604020202020204" charset="0"/>
-      <p:regular r:id="rId36"/>
+      <p:regular r:id="rId37"/>
     </p:embeddedFont>
   </p:embeddedFontLst>
   <p:defaultTextStyle>
@@ -2243,6 +2244,115 @@
     </p:spTree>
     <p:extLst>
       <p:ext uri="{BB962C8B-B14F-4D97-AF65-F5344CB8AC3E}">
+        <p14:creationId xmlns:p14="http://schemas.microsoft.com/office/powerpoint/2010/main" val="3800303968"/>
+      </p:ext>
+    </p:extLst>
+  </p:cSld>
+  <p:clrMapOvr>
+    <a:masterClrMapping/>
+  </p:clrMapOvr>
+</p:notes>
+</file>
+
+<file path=ppt/notesSlides/notesSlide22.xml><?xml version="1.0" encoding="utf-8"?>
+<p:notes xmlns:a="http://schemas.openxmlformats.org/drawingml/2006/main" xmlns:r="http://schemas.openxmlformats.org/officeDocument/2006/relationships" xmlns:p="http://schemas.openxmlformats.org/presentationml/2006/main" showMasterSp="0" showMasterPhAnim="0">
+  <p:cSld>
+    <p:spTree>
+      <p:nvGrpSpPr>
+        <p:cNvPr id="1" name="Shape 555"/>
+        <p:cNvGrpSpPr/>
+        <p:nvPr/>
+      </p:nvGrpSpPr>
+      <p:grpSpPr>
+        <a:xfrm>
+          <a:off x="0" y="0"/>
+          <a:ext cx="0" cy="0"/>
+          <a:chOff x="0" y="0"/>
+          <a:chExt cx="0" cy="0"/>
+        </a:xfrm>
+      </p:grpSpPr>
+      <p:sp>
+        <p:nvSpPr>
+          <p:cNvPr id="556" name="Google Shape;556;p:notes"/>
+          <p:cNvSpPr>
+            <a:spLocks noGrp="1" noRot="1" noChangeAspect="1"/>
+          </p:cNvSpPr>
+          <p:nvPr>
+            <p:ph type="sldImg" idx="2"/>
+          </p:nvPr>
+        </p:nvSpPr>
+        <p:spPr>
+          <a:xfrm>
+            <a:off x="381000" y="685800"/>
+            <a:ext cx="6096000" cy="3429000"/>
+          </a:xfrm>
+          <a:custGeom>
+            <a:avLst/>
+            <a:gdLst/>
+            <a:ahLst/>
+            <a:cxnLst/>
+            <a:rect l="l" t="t" r="r" b="b"/>
+            <a:pathLst>
+              <a:path w="120000" h="120000" extrusionOk="0">
+                <a:moveTo>
+                  <a:pt x="0" y="0"/>
+                </a:moveTo>
+                <a:lnTo>
+                  <a:pt x="120000" y="0"/>
+                </a:lnTo>
+                <a:lnTo>
+                  <a:pt x="120000" y="120000"/>
+                </a:lnTo>
+                <a:lnTo>
+                  <a:pt x="0" y="120000"/>
+                </a:lnTo>
+                <a:close/>
+              </a:path>
+            </a:pathLst>
+          </a:custGeom>
+        </p:spPr>
+      </p:sp>
+      <p:sp>
+        <p:nvSpPr>
+          <p:cNvPr id="557" name="Google Shape;557;p:notes"/>
+          <p:cNvSpPr txBox="1">
+            <a:spLocks noGrp="1"/>
+          </p:cNvSpPr>
+          <p:nvPr>
+            <p:ph type="body" idx="1"/>
+          </p:nvPr>
+        </p:nvSpPr>
+        <p:spPr>
+          <a:xfrm>
+            <a:off x="685800" y="4343400"/>
+            <a:ext cx="5486400" cy="4114800"/>
+          </a:xfrm>
+          <a:prstGeom prst="rect">
+            <a:avLst/>
+          </a:prstGeom>
+        </p:spPr>
+        <p:txBody>
+          <a:bodyPr spcFirstLastPara="1" wrap="square" lIns="91425" tIns="91425" rIns="91425" bIns="91425" anchor="t" anchorCtr="0">
+            <a:noAutofit/>
+          </a:bodyPr>
+          <a:lstStyle/>
+          <a:p>
+            <a:pPr marL="0" lvl="0" indent="0" algn="l" rtl="0">
+              <a:spcBef>
+                <a:spcPts val="0"/>
+              </a:spcBef>
+              <a:spcAft>
+                <a:spcPts val="0"/>
+              </a:spcAft>
+              <a:buNone/>
+            </a:pPr>
+            <a:endParaRPr/>
+          </a:p>
+        </p:txBody>
+      </p:sp>
+    </p:spTree>
+    <p:extLst>
+      <p:ext uri="{BB962C8B-B14F-4D97-AF65-F5344CB8AC3E}">
         <p14:creationId xmlns:p14="http://schemas.microsoft.com/office/powerpoint/2010/main" val="2861016640"/>
       </p:ext>
     </p:extLst>
@@ -2253,7 +2363,7 @@
 </p:notes>
 </file>
 
-<file path=ppt/notesSlides/notesSlide22.xml><?xml version="1.0" encoding="utf-8"?>
+<file path=ppt/notesSlides/notesSlide23.xml><?xml version="1.0" encoding="utf-8"?>
 <p:notes xmlns:a="http://schemas.openxmlformats.org/drawingml/2006/main" xmlns:r="http://schemas.openxmlformats.org/officeDocument/2006/relationships" xmlns:p="http://schemas.openxmlformats.org/presentationml/2006/main" showMasterSp="0" showMasterPhAnim="0">
   <p:cSld>
     <p:spTree>
@@ -16395,6 +16505,574 @@
   <p:cSld>
     <p:spTree>
       <p:nvGrpSpPr>
+        <p:cNvPr id="1" name="Shape 558"/>
+        <p:cNvGrpSpPr/>
+        <p:nvPr/>
+      </p:nvGrpSpPr>
+      <p:grpSpPr>
+        <a:xfrm>
+          <a:off x="0" y="0"/>
+          <a:ext cx="0" cy="0"/>
+          <a:chOff x="0" y="0"/>
+          <a:chExt cx="0" cy="0"/>
+        </a:xfrm>
+      </p:grpSpPr>
+      <p:sp>
+        <p:nvSpPr>
+          <p:cNvPr id="559" name="Google Shape;559;p17"/>
+          <p:cNvSpPr txBox="1">
+            <a:spLocks noGrp="1"/>
+          </p:cNvSpPr>
+          <p:nvPr>
+            <p:ph type="title"/>
+          </p:nvPr>
+        </p:nvSpPr>
+        <p:spPr>
+          <a:prstGeom prst="rect">
+            <a:avLst/>
+          </a:prstGeom>
+        </p:spPr>
+        <p:txBody>
+          <a:bodyPr spcFirstLastPara="1" wrap="square" lIns="91425" tIns="91425" rIns="91425" bIns="91425" anchor="b" anchorCtr="0">
+            <a:noAutofit/>
+          </a:bodyPr>
+          <a:lstStyle/>
+          <a:p>
+            <a:pPr lvl="0"/>
+            <a:r>
+              <a:rPr lang="en-US" sz="2800" dirty="0"/>
+              <a:t>Spring Java Configuration</a:t>
+            </a:r>
+            <a:endParaRPr sz="2800" dirty="0"/>
+          </a:p>
+        </p:txBody>
+      </p:sp>
+      <p:sp>
+        <p:nvSpPr>
+          <p:cNvPr id="560" name="Google Shape;560;p17"/>
+          <p:cNvSpPr txBox="1">
+            <a:spLocks noGrp="1"/>
+          </p:cNvSpPr>
+          <p:nvPr>
+            <p:ph type="body" idx="1"/>
+          </p:nvPr>
+        </p:nvSpPr>
+        <p:spPr>
+          <a:prstGeom prst="rect">
+            <a:avLst/>
+          </a:prstGeom>
+        </p:spPr>
+        <p:txBody>
+          <a:bodyPr spcFirstLastPara="1" wrap="square" lIns="91425" tIns="91425" rIns="91425" bIns="91425" anchor="t" anchorCtr="0">
+            <a:noAutofit/>
+          </a:bodyPr>
+          <a:lstStyle/>
+          <a:p>
+            <a:pPr marL="0" indent="0">
+              <a:buNone/>
+            </a:pPr>
+            <a:r>
+              <a:rPr lang="en-US" sz="1200" b="1" dirty="0">
+                <a:solidFill>
+                  <a:srgbClr val="646464"/>
+                </a:solidFill>
+                <a:latin typeface="Courier New" panose="02070309020205020404" pitchFamily="49" charset="0"/>
+              </a:rPr>
+              <a:t>@Configuration</a:t>
+            </a:r>
+            <a:endParaRPr lang="en-US" sz="1200" b="1" dirty="0">
+              <a:solidFill>
+                <a:srgbClr val="7F0055"/>
+              </a:solidFill>
+              <a:latin typeface="Courier New" panose="02070309020205020404" pitchFamily="49" charset="0"/>
+            </a:endParaRPr>
+          </a:p>
+          <a:p>
+            <a:pPr marL="0" indent="0">
+              <a:buNone/>
+            </a:pPr>
+            <a:r>
+              <a:rPr lang="en-US" sz="1200" b="1" dirty="0">
+                <a:solidFill>
+                  <a:srgbClr val="7F0055"/>
+                </a:solidFill>
+                <a:latin typeface="Courier New" panose="02070309020205020404" pitchFamily="49" charset="0"/>
+              </a:rPr>
+              <a:t>public</a:t>
+            </a:r>
+            <a:r>
+              <a:rPr lang="en-US" sz="1200" b="1" dirty="0">
+                <a:solidFill>
+                  <a:srgbClr val="000000"/>
+                </a:solidFill>
+                <a:latin typeface="Courier New" panose="02070309020205020404" pitchFamily="49" charset="0"/>
+              </a:rPr>
+              <a:t> </a:t>
+            </a:r>
+            <a:r>
+              <a:rPr lang="en-US" sz="1200" b="1" dirty="0">
+                <a:solidFill>
+                  <a:srgbClr val="7F0055"/>
+                </a:solidFill>
+                <a:latin typeface="Courier New" panose="02070309020205020404" pitchFamily="49" charset="0"/>
+              </a:rPr>
+              <a:t>class</a:t>
+            </a:r>
+            <a:r>
+              <a:rPr lang="en-US" sz="1200" b="1" dirty="0">
+                <a:solidFill>
+                  <a:srgbClr val="000000"/>
+                </a:solidFill>
+                <a:latin typeface="Courier New" panose="02070309020205020404" pitchFamily="49" charset="0"/>
+              </a:rPr>
+              <a:t> </a:t>
+            </a:r>
+            <a:r>
+              <a:rPr lang="en-US" sz="1200" b="1" dirty="0" err="1">
+                <a:solidFill>
+                  <a:srgbClr val="000000"/>
+                </a:solidFill>
+                <a:latin typeface="Courier New" panose="02070309020205020404" pitchFamily="49" charset="0"/>
+              </a:rPr>
+              <a:t>AppConfig</a:t>
+            </a:r>
+            <a:r>
+              <a:rPr lang="en-US" sz="1200" b="1" dirty="0">
+                <a:solidFill>
+                  <a:srgbClr val="000000"/>
+                </a:solidFill>
+                <a:latin typeface="Courier New" panose="02070309020205020404" pitchFamily="49" charset="0"/>
+              </a:rPr>
+              <a:t> {</a:t>
+            </a:r>
+          </a:p>
+          <a:p>
+            <a:pPr marL="0" indent="0">
+              <a:buNone/>
+            </a:pPr>
+            <a:r>
+              <a:rPr lang="en-US" sz="1200" dirty="0">
+                <a:solidFill>
+                  <a:srgbClr val="646464"/>
+                </a:solidFill>
+                <a:latin typeface="Courier New" panose="02070309020205020404" pitchFamily="49" charset="0"/>
+              </a:rPr>
+              <a:t>    </a:t>
+            </a:r>
+            <a:r>
+              <a:rPr lang="en-US" sz="1200" b="1" dirty="0">
+                <a:solidFill>
+                  <a:srgbClr val="646464"/>
+                </a:solidFill>
+                <a:latin typeface="Courier New" panose="02070309020205020404" pitchFamily="49" charset="0"/>
+              </a:rPr>
+              <a:t>@Bean</a:t>
+            </a:r>
+          </a:p>
+          <a:p>
+            <a:pPr marL="0" indent="0">
+              <a:buNone/>
+            </a:pPr>
+            <a:r>
+              <a:rPr lang="en-US" sz="1200" b="1" dirty="0">
+                <a:solidFill>
+                  <a:srgbClr val="7F0055"/>
+                </a:solidFill>
+                <a:latin typeface="Courier New" panose="02070309020205020404" pitchFamily="49" charset="0"/>
+              </a:rPr>
+              <a:t>    public</a:t>
+            </a:r>
+            <a:r>
+              <a:rPr lang="en-US" sz="1200" b="1" dirty="0">
+                <a:solidFill>
+                  <a:srgbClr val="000000"/>
+                </a:solidFill>
+                <a:latin typeface="Courier New" panose="02070309020205020404" pitchFamily="49" charset="0"/>
+              </a:rPr>
+              <a:t> </a:t>
+            </a:r>
+            <a:r>
+              <a:rPr lang="en-US" sz="1200" b="1" dirty="0" err="1">
+                <a:solidFill>
+                  <a:srgbClr val="000000"/>
+                </a:solidFill>
+                <a:latin typeface="Courier New" panose="02070309020205020404" pitchFamily="49" charset="0"/>
+              </a:rPr>
+              <a:t>SomeService</a:t>
+            </a:r>
+            <a:r>
+              <a:rPr lang="en-US" sz="1200" b="1" dirty="0">
+                <a:solidFill>
+                  <a:srgbClr val="000000"/>
+                </a:solidFill>
+                <a:latin typeface="Courier New" panose="02070309020205020404" pitchFamily="49" charset="0"/>
+              </a:rPr>
+              <a:t> </a:t>
+            </a:r>
+            <a:r>
+              <a:rPr lang="en-US" sz="1200" b="1" dirty="0" err="1">
+                <a:solidFill>
+                  <a:srgbClr val="000000"/>
+                </a:solidFill>
+                <a:latin typeface="Courier New" panose="02070309020205020404" pitchFamily="49" charset="0"/>
+              </a:rPr>
+              <a:t>someService</a:t>
+            </a:r>
+            <a:r>
+              <a:rPr lang="en-US" sz="1200" b="1" dirty="0">
+                <a:solidFill>
+                  <a:srgbClr val="000000"/>
+                </a:solidFill>
+                <a:latin typeface="Courier New" panose="02070309020205020404" pitchFamily="49" charset="0"/>
+              </a:rPr>
+              <a:t>(</a:t>
+            </a:r>
+            <a:r>
+              <a:rPr lang="en-US" sz="1200" b="1" dirty="0" err="1">
+                <a:solidFill>
+                  <a:srgbClr val="000000"/>
+                </a:solidFill>
+                <a:latin typeface="Courier New" panose="02070309020205020404" pitchFamily="49" charset="0"/>
+              </a:rPr>
+              <a:t>AnotherService</a:t>
+            </a:r>
+            <a:r>
+              <a:rPr lang="en-US" sz="1200" b="1" dirty="0">
+                <a:solidFill>
+                  <a:srgbClr val="000000"/>
+                </a:solidFill>
+                <a:latin typeface="Courier New" panose="02070309020205020404" pitchFamily="49" charset="0"/>
+              </a:rPr>
+              <a:t> </a:t>
+            </a:r>
+            <a:r>
+              <a:rPr lang="en-US" sz="1200" b="1" dirty="0" err="1">
+                <a:solidFill>
+                  <a:srgbClr val="000000"/>
+                </a:solidFill>
+                <a:latin typeface="Courier New" panose="02070309020205020404" pitchFamily="49" charset="0"/>
+              </a:rPr>
+              <a:t>anotherService</a:t>
+            </a:r>
+            <a:r>
+              <a:rPr lang="en-US" sz="1200" b="1" dirty="0">
+                <a:solidFill>
+                  <a:srgbClr val="000000"/>
+                </a:solidFill>
+                <a:latin typeface="Courier New" panose="02070309020205020404" pitchFamily="49" charset="0"/>
+              </a:rPr>
+              <a:t>) {</a:t>
+            </a:r>
+          </a:p>
+          <a:p>
+            <a:pPr marL="0" indent="0">
+              <a:buNone/>
+            </a:pPr>
+            <a:r>
+              <a:rPr lang="en-US" sz="1200" dirty="0">
+                <a:solidFill>
+                  <a:srgbClr val="3F7F5F"/>
+                </a:solidFill>
+                <a:latin typeface="Courier New" panose="02070309020205020404" pitchFamily="49" charset="0"/>
+              </a:rPr>
+              <a:t>        </a:t>
+            </a:r>
+            <a:r>
+              <a:rPr lang="en-US" sz="1200" b="1" dirty="0">
+                <a:solidFill>
+                  <a:srgbClr val="7F0055"/>
+                </a:solidFill>
+                <a:latin typeface="Courier New" panose="02070309020205020404" pitchFamily="49" charset="0"/>
+              </a:rPr>
+              <a:t>return new </a:t>
+            </a:r>
+            <a:r>
+              <a:rPr lang="en-US" sz="1200" b="1" dirty="0" err="1">
+                <a:solidFill>
+                  <a:srgbClr val="000000"/>
+                </a:solidFill>
+                <a:latin typeface="Courier New" panose="02070309020205020404" pitchFamily="49" charset="0"/>
+              </a:rPr>
+              <a:t>SomeServiceimpl</a:t>
+            </a:r>
+            <a:r>
+              <a:rPr lang="en-US" sz="1200" b="1" dirty="0">
+                <a:solidFill>
+                  <a:srgbClr val="000000"/>
+                </a:solidFill>
+                <a:latin typeface="Courier New" panose="02070309020205020404" pitchFamily="49" charset="0"/>
+              </a:rPr>
+              <a:t>(</a:t>
+            </a:r>
+            <a:r>
+              <a:rPr lang="en-US" sz="1200" b="1" dirty="0" err="1">
+                <a:solidFill>
+                  <a:srgbClr val="000000"/>
+                </a:solidFill>
+                <a:latin typeface="Courier New" panose="02070309020205020404" pitchFamily="49" charset="0"/>
+              </a:rPr>
+              <a:t>anotherService</a:t>
+            </a:r>
+            <a:r>
+              <a:rPr lang="en-US" sz="1200" b="1" dirty="0">
+                <a:solidFill>
+                  <a:srgbClr val="000000"/>
+                </a:solidFill>
+                <a:latin typeface="Courier New" panose="02070309020205020404" pitchFamily="49" charset="0"/>
+              </a:rPr>
+              <a:t>);</a:t>
+            </a:r>
+          </a:p>
+          <a:p>
+            <a:pPr marL="0" indent="0">
+              <a:buNone/>
+            </a:pPr>
+            <a:r>
+              <a:rPr lang="en-US" sz="1200" dirty="0">
+                <a:solidFill>
+                  <a:srgbClr val="000000"/>
+                </a:solidFill>
+                <a:latin typeface="Courier New" panose="02070309020205020404" pitchFamily="49" charset="0"/>
+              </a:rPr>
+              <a:t>    </a:t>
+            </a:r>
+            <a:r>
+              <a:rPr lang="uk-UA" sz="1200" dirty="0">
+                <a:solidFill>
+                  <a:srgbClr val="000000"/>
+                </a:solidFill>
+                <a:latin typeface="Courier New" panose="02070309020205020404" pitchFamily="49" charset="0"/>
+              </a:rPr>
+              <a:t>}</a:t>
+            </a:r>
+          </a:p>
+          <a:p>
+            <a:pPr marL="0" indent="0">
+              <a:buNone/>
+            </a:pPr>
+            <a:endParaRPr lang="en-US" sz="1200" dirty="0">
+              <a:solidFill>
+                <a:srgbClr val="000000"/>
+              </a:solidFill>
+              <a:latin typeface="Courier New" panose="02070309020205020404" pitchFamily="49" charset="0"/>
+            </a:endParaRPr>
+          </a:p>
+          <a:p>
+            <a:pPr marL="0" indent="0">
+              <a:buNone/>
+            </a:pPr>
+            <a:r>
+              <a:rPr lang="en-US" sz="1200" b="1" dirty="0">
+                <a:solidFill>
+                  <a:srgbClr val="646464"/>
+                </a:solidFill>
+                <a:latin typeface="Courier New" panose="02070309020205020404" pitchFamily="49" charset="0"/>
+              </a:rPr>
+              <a:t>    @Bean</a:t>
+            </a:r>
+          </a:p>
+          <a:p>
+            <a:pPr marL="0" indent="0">
+              <a:buNone/>
+            </a:pPr>
+            <a:r>
+              <a:rPr lang="en-US" sz="1200" b="1" dirty="0">
+                <a:solidFill>
+                  <a:srgbClr val="7F0055"/>
+                </a:solidFill>
+                <a:latin typeface="Courier New" panose="02070309020205020404" pitchFamily="49" charset="0"/>
+              </a:rPr>
+              <a:t>    public</a:t>
+            </a:r>
+            <a:r>
+              <a:rPr lang="en-US" sz="1200" b="1" dirty="0">
+                <a:solidFill>
+                  <a:srgbClr val="000000"/>
+                </a:solidFill>
+                <a:latin typeface="Courier New" panose="02070309020205020404" pitchFamily="49" charset="0"/>
+              </a:rPr>
+              <a:t> </a:t>
+            </a:r>
+            <a:r>
+              <a:rPr lang="en-US" sz="1200" b="1" dirty="0" err="1">
+                <a:solidFill>
+                  <a:srgbClr val="000000"/>
+                </a:solidFill>
+                <a:latin typeface="Courier New" panose="02070309020205020404" pitchFamily="49" charset="0"/>
+              </a:rPr>
+              <a:t>AnotherService</a:t>
+            </a:r>
+            <a:r>
+              <a:rPr lang="en-US" sz="1200" b="1" dirty="0">
+                <a:solidFill>
+                  <a:srgbClr val="000000"/>
+                </a:solidFill>
+                <a:latin typeface="Courier New" panose="02070309020205020404" pitchFamily="49" charset="0"/>
+              </a:rPr>
+              <a:t> </a:t>
+            </a:r>
+            <a:r>
+              <a:rPr lang="en-US" sz="1200" b="1" dirty="0" err="1">
+                <a:solidFill>
+                  <a:srgbClr val="000000"/>
+                </a:solidFill>
+                <a:latin typeface="Courier New" panose="02070309020205020404" pitchFamily="49" charset="0"/>
+              </a:rPr>
+              <a:t>anotherService</a:t>
+            </a:r>
+            <a:r>
+              <a:rPr lang="en-US" sz="1200" b="1" dirty="0">
+                <a:solidFill>
+                  <a:srgbClr val="000000"/>
+                </a:solidFill>
+                <a:latin typeface="Courier New" panose="02070309020205020404" pitchFamily="49" charset="0"/>
+              </a:rPr>
+              <a:t>() {</a:t>
+            </a:r>
+          </a:p>
+          <a:p>
+            <a:pPr marL="0" indent="0">
+              <a:buNone/>
+            </a:pPr>
+            <a:r>
+              <a:rPr lang="en-US" sz="1200" dirty="0">
+                <a:solidFill>
+                  <a:srgbClr val="3F7F5F"/>
+                </a:solidFill>
+                <a:latin typeface="Courier New" panose="02070309020205020404" pitchFamily="49" charset="0"/>
+              </a:rPr>
+              <a:t>        </a:t>
+            </a:r>
+            <a:r>
+              <a:rPr lang="en-US" sz="1200" b="1" dirty="0">
+                <a:solidFill>
+                  <a:srgbClr val="7F0055"/>
+                </a:solidFill>
+                <a:latin typeface="Courier New" panose="02070309020205020404" pitchFamily="49" charset="0"/>
+              </a:rPr>
+              <a:t>return </a:t>
+            </a:r>
+            <a:r>
+              <a:rPr lang="en-US" sz="1200" b="1" dirty="0" err="1">
+                <a:solidFill>
+                  <a:srgbClr val="000000"/>
+                </a:solidFill>
+                <a:latin typeface="Courier New" panose="02070309020205020404" pitchFamily="49" charset="0"/>
+              </a:rPr>
+              <a:t>AnotherServiceImpl.getInstance</a:t>
+            </a:r>
+            <a:r>
+              <a:rPr lang="en-US" sz="1200" b="1" dirty="0">
+                <a:solidFill>
+                  <a:srgbClr val="000000"/>
+                </a:solidFill>
+                <a:latin typeface="Courier New" panose="02070309020205020404" pitchFamily="49" charset="0"/>
+              </a:rPr>
+              <a:t>();</a:t>
+            </a:r>
+          </a:p>
+          <a:p>
+            <a:pPr marL="0" indent="0">
+              <a:buNone/>
+            </a:pPr>
+            <a:r>
+              <a:rPr lang="en-US" sz="1200" dirty="0">
+                <a:solidFill>
+                  <a:srgbClr val="000000"/>
+                </a:solidFill>
+                <a:latin typeface="Courier New" panose="02070309020205020404" pitchFamily="49" charset="0"/>
+              </a:rPr>
+              <a:t>    </a:t>
+            </a:r>
+            <a:r>
+              <a:rPr lang="uk-UA" sz="1200" dirty="0">
+                <a:solidFill>
+                  <a:srgbClr val="000000"/>
+                </a:solidFill>
+                <a:latin typeface="Courier New" panose="02070309020205020404" pitchFamily="49" charset="0"/>
+              </a:rPr>
+              <a:t>}</a:t>
+            </a:r>
+            <a:endParaRPr lang="en-US" sz="1200" dirty="0">
+              <a:solidFill>
+                <a:srgbClr val="000000"/>
+              </a:solidFill>
+              <a:latin typeface="Courier New" panose="02070309020205020404" pitchFamily="49" charset="0"/>
+            </a:endParaRPr>
+          </a:p>
+          <a:p>
+            <a:pPr marL="0" indent="0">
+              <a:buNone/>
+            </a:pPr>
+            <a:r>
+              <a:rPr lang="uk-UA" sz="1200" dirty="0">
+                <a:solidFill>
+                  <a:srgbClr val="000000"/>
+                </a:solidFill>
+                <a:latin typeface="Courier New" panose="02070309020205020404" pitchFamily="49" charset="0"/>
+              </a:rPr>
+              <a:t>}</a:t>
+            </a:r>
+            <a:endParaRPr lang="uk-UA" sz="1200" dirty="0"/>
+          </a:p>
+        </p:txBody>
+      </p:sp>
+      <p:sp>
+        <p:nvSpPr>
+          <p:cNvPr id="561" name="Google Shape;561;p17"/>
+          <p:cNvSpPr txBox="1">
+            <a:spLocks noGrp="1"/>
+          </p:cNvSpPr>
+          <p:nvPr>
+            <p:ph type="sldNum" idx="12"/>
+          </p:nvPr>
+        </p:nvSpPr>
+        <p:spPr>
+          <a:prstGeom prst="rect">
+            <a:avLst/>
+          </a:prstGeom>
+        </p:spPr>
+        <p:txBody>
+          <a:bodyPr spcFirstLastPara="1" wrap="square" lIns="91425" tIns="91425" rIns="91425" bIns="91425" anchor="t" anchorCtr="0">
+            <a:noAutofit/>
+          </a:bodyPr>
+          <a:lstStyle/>
+          <a:p>
+            <a:pPr marL="0" lvl="0" indent="0" algn="l" rtl="0">
+              <a:spcBef>
+                <a:spcPts val="0"/>
+              </a:spcBef>
+              <a:spcAft>
+                <a:spcPts val="0"/>
+              </a:spcAft>
+              <a:buNone/>
+            </a:pPr>
+            <a:fld id="{00000000-1234-1234-1234-123412341234}" type="slidenum">
+              <a:rPr lang="en"/>
+              <a:t>21</a:t>
+            </a:fld>
+            <a:endParaRPr/>
+          </a:p>
+        </p:txBody>
+      </p:sp>
+    </p:spTree>
+    <p:extLst>
+      <p:ext uri="{BB962C8B-B14F-4D97-AF65-F5344CB8AC3E}">
+        <p14:creationId xmlns:p14="http://schemas.microsoft.com/office/powerpoint/2010/main" val="4244601312"/>
+      </p:ext>
+    </p:extLst>
+  </p:cSld>
+  <p:clrMapOvr>
+    <a:masterClrMapping/>
+  </p:clrMapOvr>
+</p:sld>
+</file>
+
+<file path=ppt/slides/slide22.xml><?xml version="1.0" encoding="utf-8"?>
+<p:sld xmlns:a="http://schemas.openxmlformats.org/drawingml/2006/main" xmlns:r="http://schemas.openxmlformats.org/officeDocument/2006/relationships" xmlns:p="http://schemas.openxmlformats.org/presentationml/2006/main">
+  <p:cSld>
+    <p:spTree>
+      <p:nvGrpSpPr>
         <p:cNvPr id="1" name=""/>
         <p:cNvGrpSpPr/>
         <p:nvPr/>
@@ -16456,7 +17134,111 @@
                 <a:spcPct val="150000"/>
               </a:lnSpc>
             </a:pPr>
-            <a:endParaRPr lang="en-US" sz="2000" dirty="0"/>
+            <a:r>
+              <a:rPr lang="en-US" sz="1100" dirty="0"/>
+              <a:t>Make all codecs (Caesar, Morse, </a:t>
+            </a:r>
+            <a:r>
+              <a:rPr lang="en-US" sz="1100" dirty="0" err="1"/>
+              <a:t>Vigenere</a:t>
+            </a:r>
+            <a:r>
+              <a:rPr lang="en-US" sz="1100" dirty="0"/>
+              <a:t>, </a:t>
+            </a:r>
+            <a:r>
+              <a:rPr lang="en-US" sz="1100" dirty="0" err="1"/>
+              <a:t>etc</a:t>
+            </a:r>
+            <a:r>
+              <a:rPr lang="en-US" sz="1100" dirty="0"/>
+              <a:t>) Spring components (remove Codec annotation and logic that uses it)</a:t>
+            </a:r>
+          </a:p>
+          <a:p>
+            <a:pPr>
+              <a:lnSpc>
+                <a:spcPct val="150000"/>
+              </a:lnSpc>
+            </a:pPr>
+            <a:r>
+              <a:rPr lang="en-US" sz="1100" dirty="0"/>
+              <a:t>Change codec factory implementation:</a:t>
+            </a:r>
+          </a:p>
+          <a:p>
+            <a:pPr lvl="1">
+              <a:lnSpc>
+                <a:spcPct val="150000"/>
+              </a:lnSpc>
+            </a:pPr>
+            <a:r>
+              <a:rPr lang="en-US" sz="1100" dirty="0"/>
+              <a:t>Inject all codecs inside factory (using Spring)</a:t>
+            </a:r>
+          </a:p>
+          <a:p>
+            <a:pPr lvl="1">
+              <a:lnSpc>
+                <a:spcPct val="150000"/>
+              </a:lnSpc>
+            </a:pPr>
+            <a:r>
+              <a:rPr lang="en-US" sz="1100" dirty="0"/>
+              <a:t>Return the same instance of codec from factory when requested</a:t>
+            </a:r>
+          </a:p>
+          <a:p>
+            <a:pPr>
+              <a:lnSpc>
+                <a:spcPct val="150000"/>
+              </a:lnSpc>
+            </a:pPr>
+            <a:r>
+              <a:rPr lang="en-US" sz="1100" dirty="0"/>
+              <a:t>Make all loggers Spring components</a:t>
+            </a:r>
+          </a:p>
+          <a:p>
+            <a:pPr>
+              <a:lnSpc>
+                <a:spcPct val="150000"/>
+              </a:lnSpc>
+            </a:pPr>
+            <a:r>
+              <a:rPr lang="en-US" sz="1100" dirty="0"/>
+              <a:t>Inject all loggers inside </a:t>
+            </a:r>
+            <a:r>
+              <a:rPr lang="en-US" sz="1100" b="1" dirty="0" err="1"/>
+              <a:t>CompositeLogger</a:t>
+            </a:r>
+            <a:r>
+              <a:rPr lang="en-US" sz="1100" dirty="0"/>
+              <a:t> using Spring</a:t>
+            </a:r>
+          </a:p>
+          <a:p>
+            <a:pPr>
+              <a:lnSpc>
+                <a:spcPct val="150000"/>
+              </a:lnSpc>
+            </a:pPr>
+            <a:r>
+              <a:rPr lang="en-US" sz="1100" dirty="0"/>
+              <a:t>Create you own Application Context wrapper (should be singleton to be available in servlets)</a:t>
+            </a:r>
+          </a:p>
+          <a:p>
+            <a:pPr>
+              <a:lnSpc>
+                <a:spcPct val="150000"/>
+              </a:lnSpc>
+            </a:pPr>
+            <a:r>
+              <a:rPr lang="en-US" sz="1100" dirty="0"/>
+              <a:t>Use Application Context wrapper in servlets to get all required components of your application: codec factory, logger, translator (all this classes should be Spring components)</a:t>
+            </a:r>
           </a:p>
         </p:txBody>
       </p:sp>
@@ -16564,7 +17346,7 @@
             </a:pPr>
             <a:fld id="{00000000-1234-1234-1234-123412341234}" type="slidenum">
               <a:rPr lang="en" smtClean="0"/>
-              <a:t>21</a:t>
+              <a:t>22</a:t>
             </a:fld>
             <a:endParaRPr lang="en"/>
           </a:p>
@@ -16583,7 +17365,7 @@
 </p:sld>
 </file>
 
-<file path=ppt/slides/slide22.xml><?xml version="1.0" encoding="utf-8"?>
+<file path=ppt/slides/slide23.xml><?xml version="1.0" encoding="utf-8"?>
 <p:sld xmlns:a="http://schemas.openxmlformats.org/drawingml/2006/main" xmlns:r="http://schemas.openxmlformats.org/officeDocument/2006/relationships" xmlns:p="http://schemas.openxmlformats.org/presentationml/2006/main">
   <p:cSld>
     <p:spTree>
@@ -16768,7 +17550,7 @@
             </a:pPr>
             <a:fld id="{00000000-1234-1234-1234-123412341234}" type="slidenum">
               <a:rPr lang="en"/>
-              <a:t>22</a:t>
+              <a:t>23</a:t>
             </a:fld>
             <a:endParaRPr/>
           </a:p>
@@ -16787,7 +17569,7 @@
 </p:sld>
 </file>
 
-<file path=ppt/slides/slide23.xml><?xml version="1.0" encoding="utf-8"?>
+<file path=ppt/slides/slide24.xml><?xml version="1.0" encoding="utf-8"?>
 <p:sld xmlns:a="http://schemas.openxmlformats.org/drawingml/2006/main" xmlns:r="http://schemas.openxmlformats.org/officeDocument/2006/relationships" xmlns:p="http://schemas.openxmlformats.org/presentationml/2006/main">
   <p:cSld>
     <p:spTree>
@@ -17087,7 +17869,7 @@
             </a:pPr>
             <a:fld id="{00000000-1234-1234-1234-123412341234}" type="slidenum">
               <a:rPr lang="en" smtClean="0"/>
-              <a:t>23</a:t>
+              <a:t>24</a:t>
             </a:fld>
             <a:endParaRPr lang="en"/>
           </a:p>

</xml_diff>

<commit_message>
L16 Added homework details
</commit_message>
<xml_diff>
--- a/Lectures/Lesson 16 - Spring Framework.pptx
+++ b/Lectures/Lesson 16 - Spring Framework.pptx
@@ -17135,24 +17135,24 @@
               </a:lnSpc>
             </a:pPr>
             <a:r>
-              <a:rPr lang="en-US" sz="1100" dirty="0"/>
+              <a:rPr lang="en-US" sz="1050" dirty="0"/>
               <a:t>Make all codecs (Caesar, Morse, </a:t>
             </a:r>
             <a:r>
-              <a:rPr lang="en-US" sz="1100" dirty="0" err="1"/>
+              <a:rPr lang="en-US" sz="1050" dirty="0" err="1"/>
               <a:t>Vigenere</a:t>
             </a:r>
             <a:r>
-              <a:rPr lang="en-US" sz="1100" dirty="0"/>
+              <a:rPr lang="en-US" sz="1050" dirty="0"/>
               <a:t>, </a:t>
             </a:r>
             <a:r>
-              <a:rPr lang="en-US" sz="1100" dirty="0" err="1"/>
+              <a:rPr lang="en-US" sz="1050" dirty="0" err="1"/>
               <a:t>etc</a:t>
             </a:r>
             <a:r>
-              <a:rPr lang="en-US" sz="1100" dirty="0"/>
-              <a:t>) Spring components (remove Codec annotation and logic that uses it)</a:t>
+              <a:rPr lang="en-US" sz="1050" dirty="0"/>
+              <a:t>) Spring components (remove @Codec, @Key, @Shift annotations and logic that uses them)</a:t>
             </a:r>
           </a:p>
           <a:p>
@@ -17162,7 +17162,30 @@
               </a:lnSpc>
             </a:pPr>
             <a:r>
-              <a:rPr lang="en-US" sz="1100" dirty="0"/>
+              <a:rPr lang="en-US" sz="1050" dirty="0"/>
+              <a:t>Use properties that can be injected by Spring to set </a:t>
+            </a:r>
+            <a:r>
+              <a:rPr lang="en-US" sz="1050" b="1" dirty="0"/>
+              <a:t>key </a:t>
+            </a:r>
+            <a:r>
+              <a:rPr lang="en-US" sz="1050" dirty="0"/>
+              <a:t>and </a:t>
+            </a:r>
+            <a:r>
+              <a:rPr lang="en-US" sz="1050" b="1" dirty="0"/>
+              <a:t>shift</a:t>
+            </a:r>
+          </a:p>
+          <a:p>
+            <a:pPr>
+              <a:lnSpc>
+                <a:spcPct val="150000"/>
+              </a:lnSpc>
+            </a:pPr>
+            <a:r>
+              <a:rPr lang="en-US" sz="1050" dirty="0"/>
               <a:t>Change codec factory implementation:</a:t>
             </a:r>
           </a:p>
@@ -17173,7 +17196,7 @@
               </a:lnSpc>
             </a:pPr>
             <a:r>
-              <a:rPr lang="en-US" sz="1100" dirty="0"/>
+              <a:rPr lang="en-US" sz="1050" dirty="0"/>
               <a:t>Inject all codecs inside factory (using Spring)</a:t>
             </a:r>
           </a:p>
@@ -17184,7 +17207,7 @@
               </a:lnSpc>
             </a:pPr>
             <a:r>
-              <a:rPr lang="en-US" sz="1100" dirty="0"/>
+              <a:rPr lang="en-US" sz="1050" dirty="0"/>
               <a:t>Return the same instance of codec from factory when requested</a:t>
             </a:r>
           </a:p>
@@ -17195,7 +17218,7 @@
               </a:lnSpc>
             </a:pPr>
             <a:r>
-              <a:rPr lang="en-US" sz="1100" dirty="0"/>
+              <a:rPr lang="en-US" sz="1050" dirty="0"/>
               <a:t>Make all loggers Spring components</a:t>
             </a:r>
           </a:p>
@@ -17206,15 +17229,15 @@
               </a:lnSpc>
             </a:pPr>
             <a:r>
-              <a:rPr lang="en-US" sz="1100" dirty="0"/>
+              <a:rPr lang="en-US" sz="1050" dirty="0"/>
               <a:t>Inject all loggers inside </a:t>
             </a:r>
             <a:r>
-              <a:rPr lang="en-US" sz="1100" b="1" dirty="0" err="1"/>
+              <a:rPr lang="en-US" sz="1050" b="1" dirty="0" err="1"/>
               <a:t>CompositeLogger</a:t>
             </a:r>
             <a:r>
-              <a:rPr lang="en-US" sz="1100" dirty="0"/>
+              <a:rPr lang="en-US" sz="1050" dirty="0"/>
               <a:t> using Spring</a:t>
             </a:r>
           </a:p>
@@ -17225,8 +17248,20 @@
               </a:lnSpc>
             </a:pPr>
             <a:r>
-              <a:rPr lang="en-US" sz="1100" dirty="0"/>
-              <a:t>Create you own Application Context wrapper (should be singleton to be available in servlets)</a:t>
+              <a:rPr lang="en-US" sz="1050" dirty="0"/>
+              <a:t>Create you own Application Context wrapper (should be singleton and should has static method </a:t>
+            </a:r>
+            <a:r>
+              <a:rPr lang="en-US" sz="1050" b="1" dirty="0" err="1"/>
+              <a:t>getSingleton</a:t>
+            </a:r>
+            <a:r>
+              <a:rPr lang="en-US" sz="1050" b="1" dirty="0"/>
+              <a:t>()</a:t>
+            </a:r>
+            <a:r>
+              <a:rPr lang="en-US" sz="1050" dirty="0"/>
+              <a:t> to be available in servlets)</a:t>
             </a:r>
           </a:p>
           <a:p>
@@ -17236,7 +17271,7 @@
               </a:lnSpc>
             </a:pPr>
             <a:r>
-              <a:rPr lang="en-US" sz="1100" dirty="0"/>
+              <a:rPr lang="en-US" sz="1050" dirty="0"/>
               <a:t>Use Application Context wrapper in servlets to get all required components of your application: codec factory, logger, translator (all this classes should be Spring components)</a:t>
             </a:r>
           </a:p>

</xml_diff>